<commit_message>
Update for presentation and assignment
</commit_message>
<xml_diff>
--- a/Pro lektory/Prezentace.pptx
+++ b/Pro lektory/Prezentace.pptx
@@ -5,7 +5,7 @@
     <p:sldMasterId id="2147483659" r:id="rId1"/>
   </p:sldMasterIdLst>
   <p:notesMasterIdLst>
-    <p:notesMasterId r:id="rId17"/>
+    <p:notesMasterId r:id="rId18"/>
   </p:notesMasterIdLst>
   <p:sldIdLst>
     <p:sldId id="256" r:id="rId2"/>
@@ -21,30 +21,31 @@
     <p:sldId id="268" r:id="rId12"/>
     <p:sldId id="269" r:id="rId13"/>
     <p:sldId id="270" r:id="rId14"/>
-    <p:sldId id="257" r:id="rId15"/>
-    <p:sldId id="272" r:id="rId16"/>
+    <p:sldId id="273" r:id="rId15"/>
+    <p:sldId id="257" r:id="rId16"/>
+    <p:sldId id="272" r:id="rId17"/>
   </p:sldIdLst>
   <p:sldSz cx="12192000" cy="6858000"/>
   <p:notesSz cx="6858000" cy="9144000"/>
   <p:embeddedFontLst>
     <p:embeddedFont>
-      <p:font typeface="Open Sans" panose="020B0606030504020204" pitchFamily="34" charset="0"/>
-      <p:regular r:id="rId18"/>
-      <p:bold r:id="rId19"/>
-      <p:italic r:id="rId20"/>
-      <p:boldItalic r:id="rId21"/>
+      <p:font typeface="Calibri" pitchFamily="34" charset="0"/>
+      <p:regular r:id="rId19"/>
+      <p:bold r:id="rId20"/>
+      <p:italic r:id="rId21"/>
+      <p:boldItalic r:id="rId22"/>
     </p:embeddedFont>
     <p:embeddedFont>
-      <p:font typeface="Amatic SC" panose="020B0604020202020204" charset="0"/>
-      <p:regular r:id="rId22"/>
-      <p:bold r:id="rId23"/>
+      <p:font typeface="Amatic SC" charset="0"/>
+      <p:regular r:id="rId23"/>
+      <p:bold r:id="rId24"/>
     </p:embeddedFont>
     <p:embeddedFont>
-      <p:font typeface="Calibri" panose="020F0502020204030204" pitchFamily="34" charset="0"/>
-      <p:regular r:id="rId24"/>
-      <p:bold r:id="rId25"/>
-      <p:italic r:id="rId26"/>
-      <p:boldItalic r:id="rId27"/>
+      <p:font typeface="Open Sans" charset="0"/>
+      <p:regular r:id="rId25"/>
+      <p:bold r:id="rId26"/>
+      <p:italic r:id="rId27"/>
+      <p:boldItalic r:id="rId28"/>
     </p:embeddedFont>
   </p:embeddedFontLst>
   <p:defaultTextStyle>
@@ -4792,8 +4793,8 @@
         </p:nvSpPr>
         <p:spPr>
           <a:xfrm>
-            <a:off x="1081350" y="1196752"/>
-            <a:ext cx="10029300" cy="2592288"/>
+            <a:off x="0" y="980728"/>
+            <a:ext cx="12192000" cy="1728192"/>
           </a:xfrm>
           <a:prstGeom prst="rect">
             <a:avLst/>
@@ -4815,7 +4816,7 @@
               <a:buNone/>
             </a:pPr>
             <a:r>
-              <a:rPr lang="cs-CZ" sz="7200" b="1" smtClean="0">
+              <a:rPr lang="cs-CZ" sz="7200" b="1" dirty="0" smtClean="0">
                 <a:effectLst>
                   <a:outerShdw blurRad="38100" dist="38100" dir="2700000" algn="tl">
                     <a:srgbClr val="000000">
@@ -4825,47 +4826,9 @@
                 </a:effectLst>
                 <a:latin typeface="Calibri" panose="020F0502020204030204" pitchFamily="34" charset="0"/>
               </a:rPr>
-              <a:t>Úvod do </a:t>
-            </a:r>
-            <a:r>
-              <a:rPr lang="cs-CZ" sz="7200" b="1" smtClean="0">
-                <a:effectLst>
-                  <a:outerShdw blurRad="38100" dist="38100" dir="2700000" algn="tl">
-                    <a:srgbClr val="000000">
-                      <a:alpha val="43137"/>
-                    </a:srgbClr>
-                  </a:outerShdw>
-                </a:effectLst>
-                <a:latin typeface="Calibri" panose="020F0502020204030204" pitchFamily="34" charset="0"/>
-              </a:rPr>
-              <a:t>programování II</a:t>
-            </a:r>
-            <a:br>
-              <a:rPr lang="cs-CZ" sz="7200" b="1" smtClean="0">
-                <a:effectLst>
-                  <a:outerShdw blurRad="38100" dist="38100" dir="2700000" algn="tl">
-                    <a:srgbClr val="000000">
-                      <a:alpha val="43137"/>
-                    </a:srgbClr>
-                  </a:outerShdw>
-                </a:effectLst>
-                <a:latin typeface="Calibri" panose="020F0502020204030204" pitchFamily="34" charset="0"/>
-              </a:rPr>
-            </a:br>
-            <a:r>
-              <a:rPr lang="cs-CZ" sz="7200" b="1" smtClean="0">
-                <a:effectLst>
-                  <a:outerShdw blurRad="38100" dist="38100" dir="2700000" algn="tl">
-                    <a:srgbClr val="000000">
-                      <a:alpha val="43137"/>
-                    </a:srgbClr>
-                  </a:outerShdw>
-                </a:effectLst>
-                <a:latin typeface="Calibri" panose="020F0502020204030204" pitchFamily="34" charset="0"/>
-              </a:rPr>
-              <a:t>Java</a:t>
-            </a:r>
-            <a:endParaRPr sz="7200" b="1">
+              <a:t>Úvod do programování 2 - Java</a:t>
+            </a:r>
+            <a:endParaRPr sz="7200" b="1" dirty="0">
               <a:effectLst>
                 <a:outerShdw blurRad="38100" dist="38100" dir="2700000" algn="tl">
                   <a:srgbClr val="000000">
@@ -4890,8 +4853,8 @@
         </p:nvSpPr>
         <p:spPr>
           <a:xfrm>
-            <a:off x="47328" y="4005064"/>
-            <a:ext cx="12025336" cy="1296144"/>
+            <a:off x="47328" y="2708920"/>
+            <a:ext cx="12025336" cy="1080120"/>
           </a:xfrm>
           <a:prstGeom prst="rect">
             <a:avLst/>
@@ -4913,7 +4876,7 @@
               <a:buNone/>
             </a:pPr>
             <a:r>
-              <a:rPr lang="cs-CZ" sz="5400" b="1" smtClean="0">
+              <a:rPr lang="cs-CZ" sz="5400" b="1" dirty="0" smtClean="0">
                 <a:solidFill>
                   <a:schemeClr val="accent1"/>
                 </a:solidFill>
@@ -4928,6 +4891,292 @@
               </a:rPr>
               <a:t>Kamil Ševeček</a:t>
             </a:r>
+          </a:p>
+        </p:txBody>
+      </p:sp>
+      <p:sp>
+        <p:nvSpPr>
+          <p:cNvPr id="5" name="Shape 59"/>
+          <p:cNvSpPr txBox="1">
+            <a:spLocks/>
+          </p:cNvSpPr>
+          <p:nvPr/>
+        </p:nvSpPr>
+        <p:spPr>
+          <a:xfrm>
+            <a:off x="0" y="4149080"/>
+            <a:ext cx="12192000" cy="1224136"/>
+          </a:xfrm>
+          <a:prstGeom prst="rect">
+            <a:avLst/>
+          </a:prstGeom>
+          <a:noFill/>
+          <a:ln>
+            <a:noFill/>
+          </a:ln>
+        </p:spPr>
+        <p:txBody>
+          <a:bodyPr spcFirstLastPara="1" wrap="square" lIns="91425" tIns="91425" rIns="91425" bIns="91425" anchor="ctr" anchorCtr="0">
+            <a:noAutofit/>
+          </a:bodyPr>
+          <a:lstStyle>
+            <a:defPPr marR="0" lvl="0" algn="l" rtl="0">
+              <a:lnSpc>
+                <a:spcPct val="100000"/>
+              </a:lnSpc>
+              <a:spcBef>
+                <a:spcPts val="0"/>
+              </a:spcBef>
+              <a:spcAft>
+                <a:spcPts val="0"/>
+              </a:spcAft>
+            </a:defPPr>
+            <a:lvl1pPr marL="0" marR="0" lvl="0" indent="0" algn="l" rtl="0">
+              <a:lnSpc>
+                <a:spcPct val="90000"/>
+              </a:lnSpc>
+              <a:spcBef>
+                <a:spcPts val="0"/>
+              </a:spcBef>
+              <a:spcAft>
+                <a:spcPts val="0"/>
+              </a:spcAft>
+              <a:buClr>
+                <a:schemeClr val="lt1"/>
+              </a:buClr>
+              <a:buSzPts val="5800"/>
+              <a:buNone/>
+              <a:defRPr sz="5800" b="0" i="0" u="none" strike="noStrike" cap="none">
+                <a:solidFill>
+                  <a:schemeClr val="lt1"/>
+                </a:solidFill>
+                <a:latin typeface="Arial"/>
+                <a:ea typeface="Arial"/>
+                <a:cs typeface="Arial"/>
+                <a:sym typeface="Arial"/>
+              </a:defRPr>
+            </a:lvl1pPr>
+            <a:lvl2pPr lvl="1" indent="0" rtl="0">
+              <a:spcBef>
+                <a:spcPts val="0"/>
+              </a:spcBef>
+              <a:spcAft>
+                <a:spcPts val="0"/>
+              </a:spcAft>
+              <a:buClr>
+                <a:schemeClr val="lt1"/>
+              </a:buClr>
+              <a:buSzPts val="1400"/>
+              <a:buNone/>
+              <a:defRPr sz="1800">
+                <a:solidFill>
+                  <a:schemeClr val="lt1"/>
+                </a:solidFill>
+              </a:defRPr>
+            </a:lvl2pPr>
+            <a:lvl3pPr lvl="2" indent="0" rtl="0">
+              <a:spcBef>
+                <a:spcPts val="0"/>
+              </a:spcBef>
+              <a:spcAft>
+                <a:spcPts val="0"/>
+              </a:spcAft>
+              <a:buClr>
+                <a:schemeClr val="lt1"/>
+              </a:buClr>
+              <a:buSzPts val="1400"/>
+              <a:buNone/>
+              <a:defRPr sz="1800">
+                <a:solidFill>
+                  <a:schemeClr val="lt1"/>
+                </a:solidFill>
+              </a:defRPr>
+            </a:lvl3pPr>
+            <a:lvl4pPr lvl="3" indent="0" rtl="0">
+              <a:spcBef>
+                <a:spcPts val="0"/>
+              </a:spcBef>
+              <a:spcAft>
+                <a:spcPts val="0"/>
+              </a:spcAft>
+              <a:buClr>
+                <a:schemeClr val="lt1"/>
+              </a:buClr>
+              <a:buSzPts val="1400"/>
+              <a:buNone/>
+              <a:defRPr sz="1800">
+                <a:solidFill>
+                  <a:schemeClr val="lt1"/>
+                </a:solidFill>
+              </a:defRPr>
+            </a:lvl4pPr>
+            <a:lvl5pPr lvl="4" indent="0" rtl="0">
+              <a:spcBef>
+                <a:spcPts val="0"/>
+              </a:spcBef>
+              <a:spcAft>
+                <a:spcPts val="0"/>
+              </a:spcAft>
+              <a:buClr>
+                <a:schemeClr val="lt1"/>
+              </a:buClr>
+              <a:buSzPts val="1400"/>
+              <a:buNone/>
+              <a:defRPr sz="1800">
+                <a:solidFill>
+                  <a:schemeClr val="lt1"/>
+                </a:solidFill>
+              </a:defRPr>
+            </a:lvl5pPr>
+            <a:lvl6pPr lvl="5" indent="0" rtl="0">
+              <a:spcBef>
+                <a:spcPts val="0"/>
+              </a:spcBef>
+              <a:spcAft>
+                <a:spcPts val="0"/>
+              </a:spcAft>
+              <a:buClr>
+                <a:schemeClr val="lt1"/>
+              </a:buClr>
+              <a:buSzPts val="1400"/>
+              <a:buNone/>
+              <a:defRPr sz="1800">
+                <a:solidFill>
+                  <a:schemeClr val="lt1"/>
+                </a:solidFill>
+              </a:defRPr>
+            </a:lvl6pPr>
+            <a:lvl7pPr lvl="6" indent="0" rtl="0">
+              <a:spcBef>
+                <a:spcPts val="0"/>
+              </a:spcBef>
+              <a:spcAft>
+                <a:spcPts val="0"/>
+              </a:spcAft>
+              <a:buClr>
+                <a:schemeClr val="lt1"/>
+              </a:buClr>
+              <a:buSzPts val="1400"/>
+              <a:buNone/>
+              <a:defRPr sz="1800">
+                <a:solidFill>
+                  <a:schemeClr val="lt1"/>
+                </a:solidFill>
+              </a:defRPr>
+            </a:lvl7pPr>
+            <a:lvl8pPr lvl="7" indent="0" rtl="0">
+              <a:spcBef>
+                <a:spcPts val="0"/>
+              </a:spcBef>
+              <a:spcAft>
+                <a:spcPts val="0"/>
+              </a:spcAft>
+              <a:buClr>
+                <a:schemeClr val="lt1"/>
+              </a:buClr>
+              <a:buSzPts val="1400"/>
+              <a:buNone/>
+              <a:defRPr sz="1800">
+                <a:solidFill>
+                  <a:schemeClr val="lt1"/>
+                </a:solidFill>
+              </a:defRPr>
+            </a:lvl8pPr>
+            <a:lvl9pPr lvl="8" indent="0" rtl="0">
+              <a:spcBef>
+                <a:spcPts val="0"/>
+              </a:spcBef>
+              <a:spcAft>
+                <a:spcPts val="0"/>
+              </a:spcAft>
+              <a:buClr>
+                <a:schemeClr val="lt1"/>
+              </a:buClr>
+              <a:buSzPts val="1400"/>
+              <a:buNone/>
+              <a:defRPr sz="1800">
+                <a:solidFill>
+                  <a:schemeClr val="lt1"/>
+                </a:solidFill>
+              </a:defRPr>
+            </a:lvl9pPr>
+          </a:lstStyle>
+          <a:p>
+            <a:pPr algn="ctr"/>
+            <a:r>
+              <a:rPr lang="pt-BR" sz="3900" b="1" dirty="0" smtClean="0">
+                <a:effectLst>
+                  <a:outerShdw blurRad="38100" dist="38100" dir="2700000" algn="tl">
+                    <a:srgbClr val="000000">
+                      <a:alpha val="43137"/>
+                    </a:srgbClr>
+                  </a:outerShdw>
+                </a:effectLst>
+                <a:latin typeface="Calibri" panose="020F0502020204030204" pitchFamily="34" charset="0"/>
+              </a:rPr>
+              <a:t>St</a:t>
+            </a:r>
+            <a:r>
+              <a:rPr lang="cs-CZ" sz="3900" b="1" dirty="0" smtClean="0">
+                <a:effectLst>
+                  <a:outerShdw blurRad="38100" dist="38100" dir="2700000" algn="tl">
+                    <a:srgbClr val="000000">
+                      <a:alpha val="43137"/>
+                    </a:srgbClr>
+                  </a:outerShdw>
+                </a:effectLst>
+                <a:latin typeface="Calibri" panose="020F0502020204030204" pitchFamily="34" charset="0"/>
+              </a:rPr>
+              <a:t>áhněte si příklady:</a:t>
+            </a:r>
+            <a:r>
+              <a:rPr lang="cs-CZ" sz="3900" b="1" dirty="0">
+                <a:effectLst>
+                  <a:outerShdw blurRad="38100" dist="38100" dir="2700000" algn="tl">
+                    <a:srgbClr val="000000">
+                      <a:alpha val="43137"/>
+                    </a:srgbClr>
+                  </a:outerShdw>
+                </a:effectLst>
+                <a:latin typeface="Calibri" panose="020F0502020204030204" pitchFamily="34" charset="0"/>
+              </a:rPr>
+              <a:t/>
+            </a:r>
+            <a:br>
+              <a:rPr lang="cs-CZ" sz="3900" b="1" dirty="0">
+                <a:effectLst>
+                  <a:outerShdw blurRad="38100" dist="38100" dir="2700000" algn="tl">
+                    <a:srgbClr val="000000">
+                      <a:alpha val="43137"/>
+                    </a:srgbClr>
+                  </a:outerShdw>
+                </a:effectLst>
+                <a:latin typeface="Calibri" panose="020F0502020204030204" pitchFamily="34" charset="0"/>
+              </a:rPr>
+            </a:br>
+            <a:r>
+              <a:rPr lang="cs-CZ" sz="3900" b="1" dirty="0">
+                <a:effectLst>
+                  <a:outerShdw blurRad="38100" dist="38100" dir="2700000" algn="tl">
+                    <a:srgbClr val="000000">
+                      <a:alpha val="43137"/>
+                    </a:srgbClr>
+                  </a:outerShdw>
+                </a:effectLst>
+                <a:latin typeface="Calibri" panose="020F0502020204030204" pitchFamily="34" charset="0"/>
+              </a:rPr>
+              <a:t>https://javabrno.czechitas.cz/2019-podzim/java-uvod-2/</a:t>
+            </a:r>
+            <a:endParaRPr lang="pt-BR" sz="3900" b="1" dirty="0">
+              <a:effectLst>
+                <a:outerShdw blurRad="38100" dist="38100" dir="2700000" algn="tl">
+                  <a:srgbClr val="000000">
+                    <a:alpha val="43137"/>
+                  </a:srgbClr>
+                </a:outerShdw>
+              </a:effectLst>
+              <a:latin typeface="Calibri" panose="020F0502020204030204" pitchFamily="34" charset="0"/>
+            </a:endParaRPr>
           </a:p>
         </p:txBody>
       </p:sp>
@@ -5008,7 +5257,7 @@
           <a:graphicData uri="http://schemas.openxmlformats.org/presentationml/2006/ole">
             <mc:AlternateContent xmlns:mc="http://schemas.openxmlformats.org/markup-compatibility/2006">
               <mc:Choice xmlns:v="urn:schemas-microsoft-com:vml" Requires="v">
-                <p:oleObj spid="_x0000_s2086" name="Visio" r:id="rId3" imgW="4439731" imgH="2207494" progId="Visio.Drawing.11">
+                <p:oleObj spid="_x0000_s2098" name="Visio" r:id="rId3" imgW="4439731" imgH="2207494" progId="Visio.Drawing.11">
                   <p:embed/>
                 </p:oleObj>
               </mc:Choice>
@@ -5079,7 +5328,7 @@
           <a:graphicData uri="http://schemas.openxmlformats.org/presentationml/2006/ole">
             <mc:AlternateContent xmlns:mc="http://schemas.openxmlformats.org/markup-compatibility/2006">
               <mc:Choice xmlns:v="urn:schemas-microsoft-com:vml" Requires="v">
-                <p:oleObj spid="_x0000_s2087" name="Visio" r:id="rId5" imgW="4439731" imgH="2693595" progId="Visio.Drawing.11">
+                <p:oleObj spid="_x0000_s2099" name="Visio" r:id="rId5" imgW="4439731" imgH="2693595" progId="Visio.Drawing.11">
                   <p:embed/>
                 </p:oleObj>
               </mc:Choice>
@@ -5187,7 +5436,7 @@
           <a:graphicData uri="http://schemas.openxmlformats.org/presentationml/2006/ole">
             <mc:AlternateContent xmlns:mc="http://schemas.openxmlformats.org/markup-compatibility/2006">
               <mc:Choice xmlns:v="urn:schemas-microsoft-com:vml" Requires="v">
-                <p:oleObj spid="_x0000_s3110" name="Visio" r:id="rId3" imgW="4439731" imgH="1667667" progId="Visio.Drawing.11">
+                <p:oleObj spid="_x0000_s3122" name="Visio" r:id="rId3" imgW="4439731" imgH="1667667" progId="Visio.Drawing.11">
                   <p:embed/>
                 </p:oleObj>
               </mc:Choice>
@@ -5286,7 +5535,7 @@
           <a:graphicData uri="http://schemas.openxmlformats.org/presentationml/2006/ole">
             <mc:AlternateContent xmlns:mc="http://schemas.openxmlformats.org/markup-compatibility/2006">
               <mc:Choice xmlns:v="urn:schemas-microsoft-com:vml" Requires="v">
-                <p:oleObj spid="_x0000_s3111" name="Visio" r:id="rId5" imgW="5231644" imgH="5753471" progId="Visio.Drawing.11">
+                <p:oleObj spid="_x0000_s3123" name="Visio" r:id="rId5" imgW="5231644" imgH="5753471" progId="Visio.Drawing.11">
                   <p:embed/>
                 </p:oleObj>
               </mc:Choice>
@@ -5423,7 +5672,7 @@
           <a:graphicData uri="http://schemas.openxmlformats.org/presentationml/2006/ole">
             <mc:AlternateContent xmlns:mc="http://schemas.openxmlformats.org/markup-compatibility/2006">
               <mc:Choice xmlns:v="urn:schemas-microsoft-com:vml" Requires="v">
-                <p:oleObj spid="_x0000_s4116" name="Visio" r:id="rId3" imgW="8651769" imgH="3466215" progId="Visio.Drawing.11">
+                <p:oleObj spid="_x0000_s4122" name="Visio" r:id="rId3" imgW="8651769" imgH="3466215" progId="Visio.Drawing.11">
                   <p:embed/>
                 </p:oleObj>
               </mc:Choice>
@@ -5573,7 +5822,7 @@
           <a:graphicData uri="http://schemas.openxmlformats.org/presentationml/2006/ole">
             <mc:AlternateContent xmlns:mc="http://schemas.openxmlformats.org/markup-compatibility/2006">
               <mc:Choice xmlns:v="urn:schemas-microsoft-com:vml" Requires="v">
-                <p:oleObj spid="_x0000_s5157" name="Visio" r:id="rId3" imgW="5231590" imgH="6788557" progId="Visio.Drawing.11">
+                <p:oleObj spid="_x0000_s5169" name="Visio" r:id="rId3" imgW="5231590" imgH="6788557" progId="Visio.Drawing.11">
                   <p:embed/>
                 </p:oleObj>
               </mc:Choice>
@@ -5666,7 +5915,7 @@
           <a:graphicData uri="http://schemas.openxmlformats.org/presentationml/2006/ole">
             <mc:AlternateContent xmlns:mc="http://schemas.openxmlformats.org/markup-compatibility/2006">
               <mc:Choice xmlns:v="urn:schemas-microsoft-com:vml" Requires="v">
-                <p:oleObj spid="_x0000_s5158" name="Visio" r:id="rId5" imgW="8651769" imgH="3466215" progId="Visio.Drawing.11">
+                <p:oleObj spid="_x0000_s5170" name="Visio" r:id="rId5" imgW="8651769" imgH="3466215" progId="Visio.Drawing.11">
                   <p:embed/>
                 </p:oleObj>
               </mc:Choice>
@@ -5739,6 +5988,212 @@
   <p:cSld>
     <p:spTree>
       <p:nvGrpSpPr>
+        <p:cNvPr id="1" name=""/>
+        <p:cNvGrpSpPr/>
+        <p:nvPr/>
+      </p:nvGrpSpPr>
+      <p:grpSpPr>
+        <a:xfrm>
+          <a:off x="0" y="0"/>
+          <a:ext cx="0" cy="0"/>
+          <a:chOff x="0" y="0"/>
+          <a:chExt cx="0" cy="0"/>
+        </a:xfrm>
+      </p:grpSpPr>
+      <p:sp>
+        <p:nvSpPr>
+          <p:cNvPr id="4" name="Text Placeholder 3"/>
+          <p:cNvSpPr>
+            <a:spLocks noGrp="1"/>
+          </p:cNvSpPr>
+          <p:nvPr>
+            <p:ph type="body" idx="1"/>
+          </p:nvPr>
+        </p:nvSpPr>
+        <p:spPr>
+          <a:xfrm>
+            <a:off x="964660" y="1378151"/>
+            <a:ext cx="10134600" cy="5003177"/>
+          </a:xfrm>
+        </p:spPr>
+        <p:txBody>
+          <a:bodyPr/>
+          <a:lstStyle/>
+          <a:p>
+            <a:pPr marL="4681538" indent="-4630738">
+              <a:buNone/>
+            </a:pPr>
+            <a:r>
+              <a:rPr lang="cs-CZ" dirty="0" smtClean="0">
+                <a:solidFill>
+                  <a:schemeClr val="accent1"/>
+                </a:solidFill>
+              </a:rPr>
+              <a:t>new Trida()</a:t>
+            </a:r>
+            <a:r>
+              <a:rPr lang="cs-CZ" dirty="0" smtClean="0"/>
+              <a:t> ... vyrobí objekt typu Trida</a:t>
+            </a:r>
+          </a:p>
+          <a:p>
+            <a:pPr marL="4803775" indent="-4752975">
+              <a:buNone/>
+            </a:pPr>
+            <a:r>
+              <a:rPr lang="cs-CZ" dirty="0" smtClean="0">
+                <a:solidFill>
+                  <a:schemeClr val="accent1"/>
+                </a:solidFill>
+              </a:rPr>
+              <a:t>new Trida(pocatecniHodnota)</a:t>
+            </a:r>
+            <a:r>
+              <a:rPr lang="cs-CZ" dirty="0" smtClean="0"/>
+              <a:t> ... vyrobí objekt typu Trida, který má výchozí nastavení vlastností</a:t>
+            </a:r>
+          </a:p>
+          <a:p>
+            <a:pPr marL="4681538" indent="-4630738">
+              <a:buNone/>
+            </a:pPr>
+            <a:r>
+              <a:rPr lang="cs-CZ" dirty="0" smtClean="0">
+                <a:solidFill>
+                  <a:schemeClr val="accent1"/>
+                </a:solidFill>
+              </a:rPr>
+              <a:t>Typ promenna</a:t>
+            </a:r>
+            <a:r>
+              <a:rPr lang="cs-CZ" dirty="0" smtClean="0"/>
+              <a:t> ... založí novou proměnnou (prázdnou)</a:t>
+            </a:r>
+          </a:p>
+          <a:p>
+            <a:pPr marL="4681538" indent="-4630738">
+              <a:buNone/>
+            </a:pPr>
+            <a:r>
+              <a:rPr lang="cs-CZ" dirty="0" smtClean="0">
+                <a:solidFill>
+                  <a:schemeClr val="accent1"/>
+                </a:solidFill>
+              </a:rPr>
+              <a:t>Typ promenna = new Trida()</a:t>
+            </a:r>
+            <a:r>
+              <a:rPr lang="cs-CZ" dirty="0" smtClean="0"/>
+              <a:t> ... kombinace předchozích</a:t>
+            </a:r>
+          </a:p>
+          <a:p>
+            <a:pPr marL="4681538" indent="-4630738">
+              <a:buNone/>
+            </a:pPr>
+            <a:r>
+              <a:rPr lang="cs-CZ" dirty="0" smtClean="0">
+                <a:solidFill>
+                  <a:schemeClr val="accent1"/>
+                </a:solidFill>
+              </a:rPr>
+              <a:t>promenna.rozkaz()</a:t>
+            </a:r>
+            <a:r>
+              <a:rPr lang="cs-CZ" dirty="0" smtClean="0"/>
+              <a:t> ... vyvolání nějakého rozkazu</a:t>
+            </a:r>
+            <a:endParaRPr lang="cs-CZ" dirty="0" smtClean="0">
+              <a:solidFill>
+                <a:schemeClr val="accent1"/>
+              </a:solidFill>
+            </a:endParaRPr>
+          </a:p>
+          <a:p>
+            <a:pPr marL="4681538" indent="-4630738">
+              <a:buNone/>
+            </a:pPr>
+            <a:r>
+              <a:rPr lang="cs-CZ" dirty="0" smtClean="0">
+                <a:solidFill>
+                  <a:schemeClr val="accent1"/>
+                </a:solidFill>
+              </a:rPr>
+              <a:t>promenna.setVlastnost(hodnota)</a:t>
+            </a:r>
+            <a:r>
+              <a:rPr lang="cs-CZ" dirty="0" smtClean="0"/>
+              <a:t> … nastaví objektu vlastnost</a:t>
+            </a:r>
+          </a:p>
+          <a:p>
+            <a:pPr marL="6681788" indent="-6630988">
+              <a:buNone/>
+            </a:pPr>
+            <a:r>
+              <a:rPr lang="cs-CZ" dirty="0" smtClean="0">
+                <a:solidFill>
+                  <a:schemeClr val="accent1"/>
+                </a:solidFill>
+              </a:rPr>
+              <a:t>jinaPromenna = promenna.getVlastnost()</a:t>
+            </a:r>
+            <a:r>
+              <a:rPr lang="cs-CZ" dirty="0" smtClean="0"/>
+              <a:t> ... zjistí od objektu hodnotu vlastnosti</a:t>
+            </a:r>
+            <a:endParaRPr lang="cs-CZ" dirty="0"/>
+          </a:p>
+        </p:txBody>
+      </p:sp>
+      <p:sp>
+        <p:nvSpPr>
+          <p:cNvPr id="3" name="Title 2"/>
+          <p:cNvSpPr>
+            <a:spLocks noGrp="1"/>
+          </p:cNvSpPr>
+          <p:nvPr>
+            <p:ph type="title"/>
+          </p:nvPr>
+        </p:nvSpPr>
+        <p:spPr/>
+        <p:txBody>
+          <a:bodyPr/>
+          <a:lstStyle/>
+          <a:p>
+            <a:r>
+              <a:rPr lang="cs-CZ" dirty="0" smtClean="0"/>
+              <a:t>Pravidla</a:t>
+            </a:r>
+            <a:endParaRPr lang="en-US" dirty="0"/>
+          </a:p>
+        </p:txBody>
+      </p:sp>
+    </p:spTree>
+    <p:extLst>
+      <p:ext uri="{BB962C8B-B14F-4D97-AF65-F5344CB8AC3E}">
+        <p14:creationId xmlns:p14="http://schemas.microsoft.com/office/powerpoint/2010/main" val="1129373954"/>
+      </p:ext>
+    </p:extLst>
+  </p:cSld>
+  <p:clrMapOvr>
+    <a:masterClrMapping/>
+  </p:clrMapOvr>
+  <p:timing>
+    <p:tnLst>
+      <p:par>
+        <p:cTn id="1" dur="indefinite" restart="never" nodeType="tmRoot"/>
+      </p:par>
+    </p:tnLst>
+  </p:timing>
+</p:sld>
+</file>
+
+<file path=ppt/slides/slide15.xml><?xml version="1.0" encoding="utf-8"?>
+<p:sld xmlns:a="http://schemas.openxmlformats.org/drawingml/2006/main" xmlns:r="http://schemas.openxmlformats.org/officeDocument/2006/relationships" xmlns:p="http://schemas.openxmlformats.org/presentationml/2006/main">
+  <p:cSld>
+    <p:spTree>
+      <p:nvGrpSpPr>
         <p:cNvPr id="1" name="Shape 64"/>
         <p:cNvGrpSpPr/>
         <p:nvPr/>
@@ -6081,7 +6536,7 @@
 </p:sld>
 </file>
 
-<file path=ppt/slides/slide15.xml><?xml version="1.0" encoding="utf-8"?>
+<file path=ppt/slides/slide16.xml><?xml version="1.0" encoding="utf-8"?>
 <p:sld xmlns:a="http://schemas.openxmlformats.org/drawingml/2006/main" xmlns:r="http://schemas.openxmlformats.org/officeDocument/2006/relationships" xmlns:p="http://schemas.openxmlformats.org/presentationml/2006/main">
   <p:cSld>
     <p:spTree>
@@ -6098,72 +6553,35 @@
           <a:chExt cx="0" cy="0"/>
         </a:xfrm>
       </p:grpSpPr>
-      <p:sp>
-        <p:nvSpPr>
-          <p:cNvPr id="2" name="Text Placeholder 1"/>
-          <p:cNvSpPr>
-            <a:spLocks noGrp="1"/>
-          </p:cNvSpPr>
+      <p:pic>
+        <p:nvPicPr>
+          <p:cNvPr id="6" name="Picture Placeholder 5"/>
+          <p:cNvPicPr>
+            <a:picLocks noGrp="1" noChangeAspect="1"/>
+          </p:cNvPicPr>
           <p:nvPr>
-            <p:ph type="body" idx="1"/>
+            <p:ph type="pic" idx="2"/>
           </p:nvPr>
-        </p:nvSpPr>
-        <p:spPr/>
-        <p:txBody>
-          <a:bodyPr/>
-          <a:lstStyle/>
-          <a:p>
-            <a:r>
-              <a:rPr lang="cs-CZ" smtClean="0"/>
-              <a:t>Strojový kód</a:t>
-            </a:r>
-          </a:p>
-          <a:p>
-            <a:r>
-              <a:rPr lang="cs-CZ" smtClean="0"/>
-              <a:t>Strukturované programovací jazyky</a:t>
-            </a:r>
-          </a:p>
-          <a:p>
-            <a:r>
-              <a:rPr lang="cs-CZ" smtClean="0"/>
-              <a:t>Objektové programovací jazyky</a:t>
-            </a:r>
-          </a:p>
-          <a:p>
-            <a:endParaRPr lang="cs-CZ"/>
-          </a:p>
-          <a:p>
-            <a:endParaRPr lang="cs-CZ" smtClean="0"/>
-          </a:p>
-          <a:p>
-            <a:r>
-              <a:rPr lang="cs-CZ" smtClean="0"/>
-              <a:t>Kompilované</a:t>
-            </a:r>
-          </a:p>
-          <a:p>
-            <a:pPr lvl="1"/>
-            <a:r>
-              <a:rPr lang="cs-CZ" smtClean="0"/>
-              <a:t>překládané do strojového kódu</a:t>
-            </a:r>
-          </a:p>
-          <a:p>
-            <a:r>
-              <a:rPr lang="cs-CZ" smtClean="0"/>
-              <a:t>Skriptovací</a:t>
-            </a:r>
-          </a:p>
-          <a:p>
-            <a:pPr lvl="1"/>
-            <a:r>
-              <a:rPr lang="cs-CZ" smtClean="0"/>
-              <a:t>Prováděné ze zdrojového textu</a:t>
-            </a:r>
-          </a:p>
-        </p:txBody>
-      </p:sp>
+        </p:nvPicPr>
+        <p:blipFill>
+          <a:blip r:embed="rId2">
+            <a:extLst>
+              <a:ext uri="{28A0092B-C50C-407E-A947-70E740481C1C}">
+                <a14:useLocalDpi xmlns:a14="http://schemas.microsoft.com/office/drawing/2010/main" val="0"/>
+              </a:ext>
+            </a:extLst>
+          </a:blip>
+          <a:stretch>
+            <a:fillRect/>
+          </a:stretch>
+        </p:blipFill>
+        <p:spPr>
+          <a:xfrm>
+            <a:off x="446857" y="1844824"/>
+            <a:ext cx="11298287" cy="4104456"/>
+          </a:xfrm>
+        </p:spPr>
+      </p:pic>
       <p:sp>
         <p:nvSpPr>
           <p:cNvPr id="3" name="Title 2"/>
@@ -6180,23 +6598,30 @@
           <a:lstStyle/>
           <a:p>
             <a:r>
-              <a:rPr lang="cs-CZ" smtClean="0"/>
-              <a:t>Jazyky</a:t>
-            </a:r>
-            <a:endParaRPr lang="cs-CZ"/>
+              <a:rPr lang="cs-CZ" dirty="0" smtClean="0"/>
+              <a:t>Návaznost kurzů</a:t>
+            </a:r>
+            <a:endParaRPr lang="en-US" dirty="0"/>
           </a:p>
         </p:txBody>
       </p:sp>
     </p:spTree>
     <p:extLst>
       <p:ext uri="{BB962C8B-B14F-4D97-AF65-F5344CB8AC3E}">
-        <p14:creationId xmlns:p14="http://schemas.microsoft.com/office/powerpoint/2010/main" val="198605977"/>
+        <p14:creationId xmlns:p14="http://schemas.microsoft.com/office/powerpoint/2010/main" val="4073291167"/>
       </p:ext>
     </p:extLst>
   </p:cSld>
   <p:clrMapOvr>
     <a:masterClrMapping/>
   </p:clrMapOvr>
+  <p:timing>
+    <p:tnLst>
+      <p:par>
+        <p:cTn id="1" dur="indefinite" restart="never" nodeType="tmRoot"/>
+      </p:par>
+    </p:tnLst>
+  </p:timing>
 </p:sld>
 </file>
 
@@ -6726,23 +7151,7 @@
                   <a:schemeClr val="accent1"/>
                 </a:solidFill>
               </a:rPr>
-              <a:t>// Cokoliv </a:t>
-            </a:r>
-            <a:r>
-              <a:rPr lang="cs-CZ" smtClean="0">
-                <a:solidFill>
-                  <a:schemeClr val="accent1"/>
-                </a:solidFill>
-              </a:rPr>
-              <a:t>sem napíšu</a:t>
-            </a:r>
-            <a:r>
-              <a:rPr lang="cs-CZ" smtClean="0">
-                <a:solidFill>
-                  <a:schemeClr val="accent1"/>
-                </a:solidFill>
-              </a:rPr>
-              <a:t>, nebude prováděno</a:t>
+              <a:t>// Cokoliv sem napíšu, nebude prováděno</a:t>
             </a:r>
           </a:p>
           <a:p>
@@ -6836,7 +7245,12 @@
             <p:ph type="body" idx="1"/>
           </p:nvPr>
         </p:nvSpPr>
-        <p:spPr/>
+        <p:spPr>
+          <a:xfrm>
+            <a:off x="964660" y="1378151"/>
+            <a:ext cx="10134600" cy="4859161"/>
+          </a:xfrm>
+        </p:spPr>
         <p:txBody>
           <a:bodyPr>
             <a:normAutofit fontScale="92500" lnSpcReduction="20000"/>
@@ -6844,14 +7258,14 @@
           <a:lstStyle/>
           <a:p>
             <a:r>
-              <a:rPr lang="cs-CZ" smtClean="0"/>
+              <a:rPr lang="cs-CZ" dirty="0" smtClean="0"/>
               <a:t>Jednoduché typy</a:t>
             </a:r>
           </a:p>
           <a:p>
             <a:pPr lvl="1"/>
             <a:r>
-              <a:rPr lang="cs-CZ" smtClean="0">
+              <a:rPr lang="cs-CZ" dirty="0" smtClean="0">
                 <a:solidFill>
                   <a:schemeClr val="accent1"/>
                 </a:solidFill>
@@ -6859,14 +7273,14 @@
               <a:t>int</a:t>
             </a:r>
             <a:r>
-              <a:rPr lang="cs-CZ" smtClean="0"/>
+              <a:rPr lang="cs-CZ" dirty="0" smtClean="0"/>
               <a:t> ............ celé číslo</a:t>
             </a:r>
           </a:p>
           <a:p>
             <a:pPr lvl="1"/>
             <a:r>
-              <a:rPr lang="cs-CZ" smtClean="0">
+              <a:rPr lang="cs-CZ" dirty="0" smtClean="0">
                 <a:solidFill>
                   <a:schemeClr val="accent1"/>
                 </a:solidFill>
@@ -6874,14 +7288,14 @@
               <a:t>double</a:t>
             </a:r>
             <a:r>
-              <a:rPr lang="cs-CZ" smtClean="0"/>
+              <a:rPr lang="cs-CZ" dirty="0" smtClean="0"/>
               <a:t> ..... číslo i s desetinnými číslicemi</a:t>
             </a:r>
           </a:p>
           <a:p>
             <a:pPr lvl="1"/>
             <a:r>
-              <a:rPr lang="cs-CZ" smtClean="0">
+              <a:rPr lang="cs-CZ" dirty="0" smtClean="0">
                 <a:solidFill>
                   <a:schemeClr val="accent1"/>
                 </a:solidFill>
@@ -6889,14 +7303,14 @@
               <a:t>char</a:t>
             </a:r>
             <a:r>
-              <a:rPr lang="cs-CZ" smtClean="0"/>
+              <a:rPr lang="cs-CZ" dirty="0" smtClean="0"/>
               <a:t> ......... jeden znak</a:t>
             </a:r>
           </a:p>
           <a:p>
             <a:pPr lvl="1"/>
             <a:r>
-              <a:rPr lang="cs-CZ" smtClean="0">
+              <a:rPr lang="cs-CZ" dirty="0" smtClean="0">
                 <a:solidFill>
                   <a:schemeClr val="accent1"/>
                 </a:solidFill>
@@ -6904,20 +7318,20 @@
               <a:t>boolean</a:t>
             </a:r>
             <a:r>
-              <a:rPr lang="cs-CZ" smtClean="0"/>
+              <a:rPr lang="cs-CZ" dirty="0" smtClean="0"/>
               <a:t> ... ano / ne</a:t>
             </a:r>
           </a:p>
           <a:p>
             <a:r>
-              <a:rPr lang="cs-CZ" smtClean="0"/>
+              <a:rPr lang="cs-CZ" dirty="0" smtClean="0"/>
               <a:t>Složené typy</a:t>
             </a:r>
           </a:p>
           <a:p>
             <a:pPr lvl="1"/>
             <a:r>
-              <a:rPr lang="cs-CZ" smtClean="0">
+              <a:rPr lang="cs-CZ" dirty="0" smtClean="0">
                 <a:solidFill>
                   <a:schemeClr val="accent1"/>
                 </a:solidFill>
@@ -6928,7 +7342,7 @@
           <a:p>
             <a:pPr lvl="1"/>
             <a:r>
-              <a:rPr lang="cs-CZ" smtClean="0">
+              <a:rPr lang="cs-CZ" dirty="0" smtClean="0">
                 <a:solidFill>
                   <a:schemeClr val="accent1"/>
                 </a:solidFill>
@@ -6939,14 +7353,58 @@
           <a:p>
             <a:pPr lvl="1"/>
             <a:r>
-              <a:rPr lang="cs-CZ" smtClean="0">
+              <a:rPr lang="cs-CZ" dirty="0" smtClean="0">
                 <a:solidFill>
                   <a:schemeClr val="accent1"/>
                 </a:solidFill>
               </a:rPr>
               <a:t>Dimension</a:t>
             </a:r>
-            <a:endParaRPr lang="cs-CZ" smtClean="0">
+          </a:p>
+          <a:p>
+            <a:pPr lvl="1"/>
+            <a:r>
+              <a:rPr lang="cs-CZ" dirty="0" smtClean="0">
+                <a:solidFill>
+                  <a:schemeClr val="accent1"/>
+                </a:solidFill>
+              </a:rPr>
+              <a:t>LocalDate</a:t>
+            </a:r>
+          </a:p>
+          <a:p>
+            <a:pPr lvl="1"/>
+            <a:r>
+              <a:rPr lang="cs-CZ" dirty="0" smtClean="0">
+                <a:solidFill>
+                  <a:schemeClr val="accent1"/>
+                </a:solidFill>
+              </a:rPr>
+              <a:t>LocalTime</a:t>
+            </a:r>
+          </a:p>
+          <a:p>
+            <a:pPr lvl="1"/>
+            <a:r>
+              <a:rPr lang="cs-CZ" dirty="0" smtClean="0">
+                <a:solidFill>
+                  <a:schemeClr val="accent1"/>
+                </a:solidFill>
+              </a:rPr>
+              <a:t>LocalDateTime</a:t>
+            </a:r>
+          </a:p>
+          <a:p>
+            <a:pPr lvl="1"/>
+            <a:r>
+              <a:rPr lang="cs-CZ" dirty="0" smtClean="0">
+                <a:solidFill>
+                  <a:schemeClr val="accent1"/>
+                </a:solidFill>
+              </a:rPr>
+              <a:t>Random</a:t>
+            </a:r>
+            <a:endParaRPr lang="en-US" dirty="0" smtClean="0">
               <a:solidFill>
                 <a:schemeClr val="accent1"/>
               </a:solidFill>
@@ -6955,47 +7413,38 @@
           <a:p>
             <a:pPr lvl="1"/>
             <a:r>
-              <a:rPr lang="cs-CZ" smtClean="0">
+              <a:rPr lang="en-US" dirty="0" smtClean="0">
                 <a:solidFill>
                   <a:schemeClr val="accent1"/>
                 </a:solidFill>
               </a:rPr>
-              <a:t>LocalDate</a:t>
-            </a:r>
-          </a:p>
-          <a:p>
-            <a:pPr lvl="1"/>
-            <a:r>
-              <a:rPr lang="cs-CZ" smtClean="0">
+              <a:t>… (a </a:t>
+            </a:r>
+            <a:r>
+              <a:rPr lang="en-US" dirty="0" err="1" smtClean="0">
                 <a:solidFill>
                   <a:schemeClr val="accent1"/>
                 </a:solidFill>
               </a:rPr>
-              <a:t>LocalTime</a:t>
-            </a:r>
-          </a:p>
-          <a:p>
-            <a:pPr lvl="1"/>
-            <a:r>
-              <a:rPr lang="cs-CZ" smtClean="0">
+              <a:t>mnoho</a:t>
+            </a:r>
+            <a:r>
+              <a:rPr lang="en-US" dirty="0" smtClean="0">
                 <a:solidFill>
                   <a:schemeClr val="accent1"/>
                 </a:solidFill>
               </a:rPr>
-              <a:t>LocalDateTime</a:t>
-            </a:r>
-          </a:p>
-          <a:p>
-            <a:pPr lvl="1"/>
-            <a:r>
-              <a:rPr lang="cs-CZ" smtClean="0">
+              <a:t> dal</a:t>
+            </a:r>
+            <a:r>
+              <a:rPr lang="cs-CZ" dirty="0" smtClean="0">
                 <a:solidFill>
                   <a:schemeClr val="accent1"/>
                 </a:solidFill>
               </a:rPr>
-              <a:t>Random</a:t>
-            </a:r>
-            <a:endParaRPr lang="cs-CZ">
+              <a:t>ších) ...</a:t>
+            </a:r>
+            <a:endParaRPr lang="cs-CZ" dirty="0">
               <a:solidFill>
                 <a:schemeClr val="accent1"/>
               </a:solidFill>
@@ -7250,7 +7699,7 @@
           <a:graphicData uri="http://schemas.openxmlformats.org/presentationml/2006/ole">
             <mc:AlternateContent xmlns:mc="http://schemas.openxmlformats.org/markup-compatibility/2006">
               <mc:Choice xmlns:v="urn:schemas-microsoft-com:vml" Requires="v">
-                <p:oleObj spid="_x0000_s1047" name="Visio" r:id="rId3" imgW="4439731" imgH="2207494" progId="Visio.Drawing.11">
+                <p:oleObj spid="_x0000_s1053" name="Visio" r:id="rId3" imgW="4439731" imgH="2207494" progId="Visio.Drawing.11">
                   <p:embed/>
                 </p:oleObj>
               </mc:Choice>

</xml_diff>